<commit_message>
generate certi for quarterly
</commit_message>
<xml_diff>
--- a/Landing/Login/Page/template/Certificate_of_Recognition_per_Quarter_template.pptx
+++ b/Landing/Login/Page/template/Certificate_of_Recognition_per_Quarter_template.pptx
@@ -655,7 +655,7 @@
           <a:p>
             <a:fld id="{C4E936A5-A9CF-44B2-8074-55349999D5D2}" type="datetimeFigureOut">
               <a:rPr lang="en-PH" smtClean="0"/>
-              <a:t>15/10/2025</a:t>
+              <a:t>16/10/2025</a:t>
             </a:fld>
             <a:endParaRPr lang="en-PH"/>
           </a:p>
@@ -825,7 +825,7 @@
           <a:p>
             <a:fld id="{C4E936A5-A9CF-44B2-8074-55349999D5D2}" type="datetimeFigureOut">
               <a:rPr lang="en-PH" smtClean="0"/>
-              <a:t>15/10/2025</a:t>
+              <a:t>16/10/2025</a:t>
             </a:fld>
             <a:endParaRPr lang="en-PH"/>
           </a:p>
@@ -1005,7 +1005,7 @@
           <a:p>
             <a:fld id="{C4E936A5-A9CF-44B2-8074-55349999D5D2}" type="datetimeFigureOut">
               <a:rPr lang="en-PH" smtClean="0"/>
-              <a:t>15/10/2025</a:t>
+              <a:t>16/10/2025</a:t>
             </a:fld>
             <a:endParaRPr lang="en-PH"/>
           </a:p>
@@ -1175,7 +1175,7 @@
           <a:p>
             <a:fld id="{C4E936A5-A9CF-44B2-8074-55349999D5D2}" type="datetimeFigureOut">
               <a:rPr lang="en-PH" smtClean="0"/>
-              <a:t>15/10/2025</a:t>
+              <a:t>16/10/2025</a:t>
             </a:fld>
             <a:endParaRPr lang="en-PH"/>
           </a:p>
@@ -1419,7 +1419,7 @@
           <a:p>
             <a:fld id="{C4E936A5-A9CF-44B2-8074-55349999D5D2}" type="datetimeFigureOut">
               <a:rPr lang="en-PH" smtClean="0"/>
-              <a:t>15/10/2025</a:t>
+              <a:t>16/10/2025</a:t>
             </a:fld>
             <a:endParaRPr lang="en-PH"/>
           </a:p>
@@ -1651,7 +1651,7 @@
           <a:p>
             <a:fld id="{C4E936A5-A9CF-44B2-8074-55349999D5D2}" type="datetimeFigureOut">
               <a:rPr lang="en-PH" smtClean="0"/>
-              <a:t>15/10/2025</a:t>
+              <a:t>16/10/2025</a:t>
             </a:fld>
             <a:endParaRPr lang="en-PH"/>
           </a:p>
@@ -2018,7 +2018,7 @@
           <a:p>
             <a:fld id="{C4E936A5-A9CF-44B2-8074-55349999D5D2}" type="datetimeFigureOut">
               <a:rPr lang="en-PH" smtClean="0"/>
-              <a:t>15/10/2025</a:t>
+              <a:t>16/10/2025</a:t>
             </a:fld>
             <a:endParaRPr lang="en-PH"/>
           </a:p>
@@ -2136,7 +2136,7 @@
           <a:p>
             <a:fld id="{C4E936A5-A9CF-44B2-8074-55349999D5D2}" type="datetimeFigureOut">
               <a:rPr lang="en-PH" smtClean="0"/>
-              <a:t>15/10/2025</a:t>
+              <a:t>16/10/2025</a:t>
             </a:fld>
             <a:endParaRPr lang="en-PH"/>
           </a:p>
@@ -2231,7 +2231,7 @@
           <a:p>
             <a:fld id="{C4E936A5-A9CF-44B2-8074-55349999D5D2}" type="datetimeFigureOut">
               <a:rPr lang="en-PH" smtClean="0"/>
-              <a:t>15/10/2025</a:t>
+              <a:t>16/10/2025</a:t>
             </a:fld>
             <a:endParaRPr lang="en-PH"/>
           </a:p>
@@ -2508,7 +2508,7 @@
           <a:p>
             <a:fld id="{C4E936A5-A9CF-44B2-8074-55349999D5D2}" type="datetimeFigureOut">
               <a:rPr lang="en-PH" smtClean="0"/>
-              <a:t>15/10/2025</a:t>
+              <a:t>16/10/2025</a:t>
             </a:fld>
             <a:endParaRPr lang="en-PH"/>
           </a:p>
@@ -2765,7 +2765,7 @@
           <a:p>
             <a:fld id="{C4E936A5-A9CF-44B2-8074-55349999D5D2}" type="datetimeFigureOut">
               <a:rPr lang="en-PH" smtClean="0"/>
-              <a:t>15/10/2025</a:t>
+              <a:t>16/10/2025</a:t>
             </a:fld>
             <a:endParaRPr lang="en-PH"/>
           </a:p>
@@ -2978,7 +2978,7 @@
           <a:p>
             <a:fld id="{C4E936A5-A9CF-44B2-8074-55349999D5D2}" type="datetimeFigureOut">
               <a:rPr lang="en-PH" smtClean="0"/>
-              <a:t>15/10/2025</a:t>
+              <a:t>16/10/2025</a:t>
             </a:fld>
             <a:endParaRPr lang="en-PH"/>
           </a:p>
@@ -4170,7 +4170,15 @@
             <a:pPr algn="ctr"/>
             <a:r>
               <a:rPr lang="en-US" sz="1160" i="1" dirty="0"/>
-              <a:t>@{grade_level} – ${section}</a:t>
+              <a:t>$</a:t>
+            </a:r>
+            <a:r>
+              <a:rPr lang="en-US" sz="1160" i="1"/>
+              <a:t>{</a:t>
+            </a:r>
+            <a:r>
+              <a:rPr lang="en-US" sz="1160" i="1" dirty="0"/>
+              <a:t>grade_level} – ${section}</a:t>
             </a:r>
           </a:p>
         </p:txBody>

</xml_diff>